<commit_message>
clean up unnecessary files
</commit_message>
<xml_diff>
--- a/images/plateimg.pptx
+++ b/images/plateimg.pptx
@@ -6,6 +6,8 @@
   </p:sldMasterIdLst>
   <p:sldIdLst>
     <p:sldId id="259" r:id="rId2"/>
+    <p:sldId id="261" r:id="rId3"/>
+    <p:sldId id="260" r:id="rId4"/>
   </p:sldIdLst>
   <p:sldSz cx="12192000" cy="6858000"/>
   <p:notesSz cx="6858000" cy="9144000"/>
@@ -259,7 +261,7 @@
           <a:p>
             <a:fld id="{F1435FB5-0B67-45F6-8A0D-BF174DE11C7A}" type="datetimeFigureOut">
               <a:rPr lang="ko-KR" altLang="en-US" smtClean="0"/>
-              <a:t>2026-02-06</a:t>
+              <a:t>2026-02-10</a:t>
             </a:fld>
             <a:endParaRPr lang="ko-KR" altLang="en-US"/>
           </a:p>
@@ -457,7 +459,7 @@
           <a:p>
             <a:fld id="{F1435FB5-0B67-45F6-8A0D-BF174DE11C7A}" type="datetimeFigureOut">
               <a:rPr lang="ko-KR" altLang="en-US" smtClean="0"/>
-              <a:t>2026-02-06</a:t>
+              <a:t>2026-02-10</a:t>
             </a:fld>
             <a:endParaRPr lang="ko-KR" altLang="en-US"/>
           </a:p>
@@ -665,7 +667,7 @@
           <a:p>
             <a:fld id="{F1435FB5-0B67-45F6-8A0D-BF174DE11C7A}" type="datetimeFigureOut">
               <a:rPr lang="ko-KR" altLang="en-US" smtClean="0"/>
-              <a:t>2026-02-06</a:t>
+              <a:t>2026-02-10</a:t>
             </a:fld>
             <a:endParaRPr lang="ko-KR" altLang="en-US"/>
           </a:p>
@@ -863,7 +865,7 @@
           <a:p>
             <a:fld id="{F1435FB5-0B67-45F6-8A0D-BF174DE11C7A}" type="datetimeFigureOut">
               <a:rPr lang="ko-KR" altLang="en-US" smtClean="0"/>
-              <a:t>2026-02-06</a:t>
+              <a:t>2026-02-10</a:t>
             </a:fld>
             <a:endParaRPr lang="ko-KR" altLang="en-US"/>
           </a:p>
@@ -1138,7 +1140,7 @@
           <a:p>
             <a:fld id="{F1435FB5-0B67-45F6-8A0D-BF174DE11C7A}" type="datetimeFigureOut">
               <a:rPr lang="ko-KR" altLang="en-US" smtClean="0"/>
-              <a:t>2026-02-06</a:t>
+              <a:t>2026-02-10</a:t>
             </a:fld>
             <a:endParaRPr lang="ko-KR" altLang="en-US"/>
           </a:p>
@@ -1403,7 +1405,7 @@
           <a:p>
             <a:fld id="{F1435FB5-0B67-45F6-8A0D-BF174DE11C7A}" type="datetimeFigureOut">
               <a:rPr lang="ko-KR" altLang="en-US" smtClean="0"/>
-              <a:t>2026-02-06</a:t>
+              <a:t>2026-02-10</a:t>
             </a:fld>
             <a:endParaRPr lang="ko-KR" altLang="en-US"/>
           </a:p>
@@ -1815,7 +1817,7 @@
           <a:p>
             <a:fld id="{F1435FB5-0B67-45F6-8A0D-BF174DE11C7A}" type="datetimeFigureOut">
               <a:rPr lang="ko-KR" altLang="en-US" smtClean="0"/>
-              <a:t>2026-02-06</a:t>
+              <a:t>2026-02-10</a:t>
             </a:fld>
             <a:endParaRPr lang="ko-KR" altLang="en-US"/>
           </a:p>
@@ -1956,7 +1958,7 @@
           <a:p>
             <a:fld id="{F1435FB5-0B67-45F6-8A0D-BF174DE11C7A}" type="datetimeFigureOut">
               <a:rPr lang="ko-KR" altLang="en-US" smtClean="0"/>
-              <a:t>2026-02-06</a:t>
+              <a:t>2026-02-10</a:t>
             </a:fld>
             <a:endParaRPr lang="ko-KR" altLang="en-US"/>
           </a:p>
@@ -2069,7 +2071,7 @@
           <a:p>
             <a:fld id="{F1435FB5-0B67-45F6-8A0D-BF174DE11C7A}" type="datetimeFigureOut">
               <a:rPr lang="ko-KR" altLang="en-US" smtClean="0"/>
-              <a:t>2026-02-06</a:t>
+              <a:t>2026-02-10</a:t>
             </a:fld>
             <a:endParaRPr lang="ko-KR" altLang="en-US"/>
           </a:p>
@@ -2380,7 +2382,7 @@
           <a:p>
             <a:fld id="{F1435FB5-0B67-45F6-8A0D-BF174DE11C7A}" type="datetimeFigureOut">
               <a:rPr lang="ko-KR" altLang="en-US" smtClean="0"/>
-              <a:t>2026-02-06</a:t>
+              <a:t>2026-02-10</a:t>
             </a:fld>
             <a:endParaRPr lang="ko-KR" altLang="en-US"/>
           </a:p>
@@ -2668,7 +2670,7 @@
           <a:p>
             <a:fld id="{F1435FB5-0B67-45F6-8A0D-BF174DE11C7A}" type="datetimeFigureOut">
               <a:rPr lang="ko-KR" altLang="en-US" smtClean="0"/>
-              <a:t>2026-02-06</a:t>
+              <a:t>2026-02-10</a:t>
             </a:fld>
             <a:endParaRPr lang="ko-KR" altLang="en-US"/>
           </a:p>
@@ -2909,7 +2911,7 @@
           <a:p>
             <a:fld id="{F1435FB5-0B67-45F6-8A0D-BF174DE11C7A}" type="datetimeFigureOut">
               <a:rPr lang="ko-KR" altLang="en-US" smtClean="0"/>
-              <a:t>2026-02-06</a:t>
+              <a:t>2026-02-10</a:t>
             </a:fld>
             <a:endParaRPr lang="ko-KR" altLang="en-US"/>
           </a:p>
@@ -3346,10 +3348,10 @@
         </p:nvGrpSpPr>
         <p:grpSpPr>
           <a:xfrm>
-            <a:off x="891999" y="446186"/>
-            <a:ext cx="9878214" cy="5595153"/>
-            <a:chOff x="891999" y="446186"/>
-            <a:chExt cx="9878214" cy="5595153"/>
+            <a:off x="1821197" y="547563"/>
+            <a:ext cx="6153563" cy="3454619"/>
+            <a:chOff x="561357" y="446186"/>
+            <a:chExt cx="6153563" cy="3454619"/>
           </a:xfrm>
         </p:grpSpPr>
         <p:grpSp>
@@ -3366,10 +3368,10 @@
           </p:nvGrpSpPr>
           <p:grpSpPr>
             <a:xfrm>
-              <a:off x="891999" y="446186"/>
-              <a:ext cx="1559799" cy="1753868"/>
-              <a:chOff x="761371" y="919049"/>
-              <a:chExt cx="1559799" cy="1753868"/>
+              <a:off x="687683" y="446186"/>
+              <a:ext cx="1459315" cy="1473452"/>
+              <a:chOff x="557055" y="919049"/>
+              <a:chExt cx="1459315" cy="1473452"/>
             </a:xfrm>
           </p:grpSpPr>
           <p:pic>
@@ -3401,7 +3403,7 @@
             <p:spPr>
               <a:xfrm>
                 <a:off x="761371" y="919049"/>
-                <a:ext cx="1384536" cy="1384536"/>
+                <a:ext cx="730899" cy="730899"/>
               </a:xfrm>
               <a:prstGeom prst="rect">
                 <a:avLst/>
@@ -3422,7 +3424,7 @@
             </p:nvSpPr>
             <p:spPr>
               <a:xfrm>
-                <a:off x="861855" y="2303585"/>
+                <a:off x="557055" y="2023169"/>
                 <a:ext cx="1459315" cy="369332"/>
               </a:xfrm>
               <a:prstGeom prst="rect">
@@ -3459,10 +3461,10 @@
           </p:nvGrpSpPr>
           <p:grpSpPr>
             <a:xfrm>
-              <a:off x="3286968" y="446186"/>
-              <a:ext cx="1596530" cy="1753867"/>
-              <a:chOff x="1193450" y="3698169"/>
-              <a:chExt cx="1596530" cy="1753867"/>
+              <a:off x="2886447" y="460745"/>
+              <a:ext cx="1459315" cy="1458893"/>
+              <a:chOff x="792929" y="3712728"/>
+              <a:chExt cx="1459315" cy="1458893"/>
             </a:xfrm>
           </p:grpSpPr>
           <p:pic>
@@ -3493,8 +3495,8 @@
             </p:blipFill>
             <p:spPr>
               <a:xfrm>
-                <a:off x="1193450" y="3698169"/>
-                <a:ext cx="1384535" cy="1384535"/>
+                <a:off x="983178" y="3712728"/>
+                <a:ext cx="730898" cy="730898"/>
               </a:xfrm>
               <a:prstGeom prst="rect">
                 <a:avLst/>
@@ -3515,7 +3517,7 @@
             </p:nvSpPr>
             <p:spPr>
               <a:xfrm>
-                <a:off x="1330665" y="5082704"/>
+                <a:off x="792929" y="4802289"/>
                 <a:ext cx="1459315" cy="369332"/>
               </a:xfrm>
               <a:prstGeom prst="rect">
@@ -3552,10 +3554,10 @@
           </p:nvGrpSpPr>
           <p:grpSpPr>
             <a:xfrm>
-              <a:off x="5506673" y="446186"/>
-              <a:ext cx="1565756" cy="1753867"/>
-              <a:chOff x="6440993" y="3587636"/>
-              <a:chExt cx="1565756" cy="1753867"/>
+              <a:off x="5255605" y="446187"/>
+              <a:ext cx="1459315" cy="1458893"/>
+              <a:chOff x="6189925" y="3587637"/>
+              <a:chExt cx="1459315" cy="1458893"/>
             </a:xfrm>
           </p:grpSpPr>
           <p:pic>
@@ -3586,8 +3588,8 @@
             </p:blipFill>
             <p:spPr>
               <a:xfrm>
-                <a:off x="6440993" y="3587636"/>
-                <a:ext cx="1384535" cy="1384535"/>
+                <a:off x="6440994" y="3587637"/>
+                <a:ext cx="730898" cy="730898"/>
               </a:xfrm>
               <a:prstGeom prst="rect">
                 <a:avLst/>
@@ -3608,7 +3610,7 @@
             </p:nvSpPr>
             <p:spPr>
               <a:xfrm>
-                <a:off x="6547434" y="4972171"/>
+                <a:off x="6189925" y="4677198"/>
                 <a:ext cx="1459315" cy="369332"/>
               </a:xfrm>
               <a:prstGeom prst="rect">
@@ -3659,8 +3661,8 @@
           </p:blipFill>
           <p:spPr>
             <a:xfrm>
-              <a:off x="891999" y="3090578"/>
-              <a:ext cx="2550146" cy="2550146"/>
+              <a:off x="792480" y="2589496"/>
+              <a:ext cx="879198" cy="879198"/>
             </a:xfrm>
             <a:prstGeom prst="rect">
               <a:avLst/>
@@ -3681,7 +3683,7 @@
           </p:nvSpPr>
           <p:spPr>
             <a:xfrm>
-              <a:off x="1546877" y="5640723"/>
+              <a:off x="561357" y="3483253"/>
               <a:ext cx="1459315" cy="369332"/>
             </a:xfrm>
             <a:prstGeom prst="rect">
@@ -3731,8 +3733,8 @@
           </p:blipFill>
           <p:spPr>
             <a:xfrm>
-              <a:off x="4556035" y="3090578"/>
-              <a:ext cx="2550144" cy="2550144"/>
+              <a:off x="2987953" y="2604054"/>
+              <a:ext cx="879197" cy="879197"/>
             </a:xfrm>
             <a:prstGeom prst="rect">
               <a:avLst/>
@@ -3753,7 +3755,7 @@
           </p:nvSpPr>
           <p:spPr>
             <a:xfrm>
-              <a:off x="5255606" y="5640722"/>
+              <a:off x="2712487" y="3518448"/>
               <a:ext cx="1459315" cy="369332"/>
             </a:xfrm>
             <a:prstGeom prst="rect">
@@ -3803,8 +3805,8 @@
           </p:blipFill>
           <p:spPr>
             <a:xfrm>
-              <a:off x="8220069" y="3090578"/>
-              <a:ext cx="2550144" cy="2550144"/>
+              <a:off x="5488435" y="2604054"/>
+              <a:ext cx="879197" cy="879197"/>
             </a:xfrm>
             <a:prstGeom prst="rect">
               <a:avLst/>
@@ -3825,7 +3827,7 @@
           </p:nvSpPr>
           <p:spPr>
             <a:xfrm>
-              <a:off x="9021240" y="5672007"/>
+              <a:off x="5255604" y="3531473"/>
               <a:ext cx="1459315" cy="369332"/>
             </a:xfrm>
             <a:prstGeom prst="rect">
@@ -3848,10 +3850,1067 @@
           </p:txBody>
         </p:sp>
       </p:grpSp>
+      <p:pic>
+        <p:nvPicPr>
+          <p:cNvPr id="24" name="그림 23" descr="패턴, 사각형, 예술, 직사각형이(가) 표시된 사진&#10;&#10;AI 생성 콘텐츠는 정확하지 않을 수 있습니다.">
+            <a:extLst>
+              <a:ext uri="{FF2B5EF4-FFF2-40B4-BE49-F238E27FC236}">
+                <a16:creationId xmlns:a16="http://schemas.microsoft.com/office/drawing/2014/main" id="{D89058A6-C503-AA6E-31C9-337B915A9DDE}"/>
+              </a:ext>
+            </a:extLst>
+          </p:cNvPr>
+          <p:cNvPicPr>
+            <a:picLocks noChangeAspect="1"/>
+          </p:cNvPicPr>
+          <p:nvPr/>
+        </p:nvPicPr>
+        <p:blipFill>
+          <a:blip r:embed="rId2">
+            <a:extLst>
+              <a:ext uri="{28A0092B-C50C-407E-A947-70E740481C1C}">
+                <a14:useLocalDpi xmlns:a14="http://schemas.microsoft.com/office/drawing/2010/main" val="0"/>
+              </a:ext>
+            </a:extLst>
+          </a:blip>
+          <a:stretch>
+            <a:fillRect/>
+          </a:stretch>
+        </p:blipFill>
+        <p:spPr>
+          <a:xfrm>
+            <a:off x="2052321" y="4765709"/>
+            <a:ext cx="597406" cy="597406"/>
+          </a:xfrm>
+          <a:prstGeom prst="rect">
+            <a:avLst/>
+          </a:prstGeom>
+        </p:spPr>
+      </p:pic>
+      <p:sp>
+        <p:nvSpPr>
+          <p:cNvPr id="25" name="TextBox 24">
+            <a:extLst>
+              <a:ext uri="{FF2B5EF4-FFF2-40B4-BE49-F238E27FC236}">
+                <a16:creationId xmlns:a16="http://schemas.microsoft.com/office/drawing/2014/main" id="{C9E63878-4D45-77A7-995A-33F1C006B2FA}"/>
+              </a:ext>
+            </a:extLst>
+          </p:cNvPr>
+          <p:cNvSpPr txBox="1"/>
+          <p:nvPr/>
+        </p:nvSpPr>
+        <p:spPr>
+          <a:xfrm>
+            <a:off x="1848004" y="5736336"/>
+            <a:ext cx="1459315" cy="369332"/>
+          </a:xfrm>
+          <a:prstGeom prst="rect">
+            <a:avLst/>
+          </a:prstGeom>
+          <a:noFill/>
+        </p:spPr>
+        <p:txBody>
+          <a:bodyPr wrap="square" rtlCol="0">
+            <a:spAutoFit/>
+          </a:bodyPr>
+          <a:lstStyle/>
+          <a:p>
+            <a:r>
+              <a:rPr lang="en-US" altLang="ko-KR" dirty="0"/>
+              <a:t>position1</a:t>
+            </a:r>
+            <a:endParaRPr lang="ko-KR" altLang="en-US" dirty="0"/>
+          </a:p>
+        </p:txBody>
+      </p:sp>
+      <p:pic>
+        <p:nvPicPr>
+          <p:cNvPr id="26" name="그림 25" descr="패턴, 사각형, 예술, 직사각형이(가) 표시된 사진&#10;&#10;AI 생성 콘텐츠는 정확하지 않을 수 있습니다.">
+            <a:extLst>
+              <a:ext uri="{FF2B5EF4-FFF2-40B4-BE49-F238E27FC236}">
+                <a16:creationId xmlns:a16="http://schemas.microsoft.com/office/drawing/2014/main" id="{E6B2B28D-748F-35E6-567D-565B4A458763}"/>
+              </a:ext>
+            </a:extLst>
+          </p:cNvPr>
+          <p:cNvPicPr>
+            <a:picLocks noChangeAspect="1"/>
+          </p:cNvPicPr>
+          <p:nvPr/>
+        </p:nvPicPr>
+        <p:blipFill>
+          <a:blip r:embed="rId3">
+            <a:extLst>
+              <a:ext uri="{28A0092B-C50C-407E-A947-70E740481C1C}">
+                <a14:useLocalDpi xmlns:a14="http://schemas.microsoft.com/office/drawing/2010/main" val="0"/>
+              </a:ext>
+            </a:extLst>
+          </a:blip>
+          <a:stretch>
+            <a:fillRect/>
+          </a:stretch>
+        </p:blipFill>
+        <p:spPr>
+          <a:xfrm>
+            <a:off x="4237017" y="4780267"/>
+            <a:ext cx="597405" cy="597405"/>
+          </a:xfrm>
+          <a:prstGeom prst="rect">
+            <a:avLst/>
+          </a:prstGeom>
+        </p:spPr>
+      </p:pic>
+      <p:sp>
+        <p:nvSpPr>
+          <p:cNvPr id="27" name="TextBox 26">
+            <a:extLst>
+              <a:ext uri="{FF2B5EF4-FFF2-40B4-BE49-F238E27FC236}">
+                <a16:creationId xmlns:a16="http://schemas.microsoft.com/office/drawing/2014/main" id="{E0F4E567-31BC-26E9-D45C-78B3BE3CE011}"/>
+              </a:ext>
+            </a:extLst>
+          </p:cNvPr>
+          <p:cNvSpPr txBox="1"/>
+          <p:nvPr/>
+        </p:nvSpPr>
+        <p:spPr>
+          <a:xfrm>
+            <a:off x="4046768" y="5736336"/>
+            <a:ext cx="1459315" cy="369332"/>
+          </a:xfrm>
+          <a:prstGeom prst="rect">
+            <a:avLst/>
+          </a:prstGeom>
+          <a:noFill/>
+        </p:spPr>
+        <p:txBody>
+          <a:bodyPr wrap="square" rtlCol="0">
+            <a:spAutoFit/>
+          </a:bodyPr>
+          <a:lstStyle/>
+          <a:p>
+            <a:r>
+              <a:rPr lang="en-US" altLang="ko-KR" dirty="0"/>
+              <a:t>position2</a:t>
+            </a:r>
+            <a:endParaRPr lang="ko-KR" altLang="en-US" dirty="0"/>
+          </a:p>
+        </p:txBody>
+      </p:sp>
+      <p:pic>
+        <p:nvPicPr>
+          <p:cNvPr id="28" name="그림 27">
+            <a:extLst>
+              <a:ext uri="{FF2B5EF4-FFF2-40B4-BE49-F238E27FC236}">
+                <a16:creationId xmlns:a16="http://schemas.microsoft.com/office/drawing/2014/main" id="{54318CAD-D670-1C28-C8DB-F4B7D4707B21}"/>
+              </a:ext>
+            </a:extLst>
+          </p:cNvPr>
+          <p:cNvPicPr>
+            <a:picLocks noChangeAspect="1"/>
+          </p:cNvPicPr>
+          <p:nvPr/>
+        </p:nvPicPr>
+        <p:blipFill>
+          <a:blip r:embed="rId4">
+            <a:extLst>
+              <a:ext uri="{28A0092B-C50C-407E-A947-70E740481C1C}">
+                <a14:useLocalDpi xmlns:a14="http://schemas.microsoft.com/office/drawing/2010/main" val="0"/>
+              </a:ext>
+            </a:extLst>
+          </a:blip>
+          <a:stretch>
+            <a:fillRect/>
+          </a:stretch>
+        </p:blipFill>
+        <p:spPr>
+          <a:xfrm>
+            <a:off x="6666995" y="4765709"/>
+            <a:ext cx="597405" cy="597405"/>
+          </a:xfrm>
+          <a:prstGeom prst="rect">
+            <a:avLst/>
+          </a:prstGeom>
+        </p:spPr>
+      </p:pic>
+      <p:sp>
+        <p:nvSpPr>
+          <p:cNvPr id="29" name="TextBox 28">
+            <a:extLst>
+              <a:ext uri="{FF2B5EF4-FFF2-40B4-BE49-F238E27FC236}">
+                <a16:creationId xmlns:a16="http://schemas.microsoft.com/office/drawing/2014/main" id="{64D4CF7D-9DD1-3FE9-9F0D-A9F7343E3EF8}"/>
+              </a:ext>
+            </a:extLst>
+          </p:cNvPr>
+          <p:cNvSpPr txBox="1"/>
+          <p:nvPr/>
+        </p:nvSpPr>
+        <p:spPr>
+          <a:xfrm>
+            <a:off x="6415926" y="5721778"/>
+            <a:ext cx="1459315" cy="369332"/>
+          </a:xfrm>
+          <a:prstGeom prst="rect">
+            <a:avLst/>
+          </a:prstGeom>
+          <a:noFill/>
+        </p:spPr>
+        <p:txBody>
+          <a:bodyPr wrap="square" rtlCol="0">
+            <a:spAutoFit/>
+          </a:bodyPr>
+          <a:lstStyle/>
+          <a:p>
+            <a:r>
+              <a:rPr lang="en-US" altLang="ko-KR" dirty="0"/>
+              <a:t>position3</a:t>
+            </a:r>
+            <a:endParaRPr lang="ko-KR" altLang="en-US" dirty="0"/>
+          </a:p>
+        </p:txBody>
+      </p:sp>
     </p:spTree>
     <p:extLst>
       <p:ext uri="{BB962C8B-B14F-4D97-AF65-F5344CB8AC3E}">
         <p14:creationId xmlns:p14="http://schemas.microsoft.com/office/powerpoint/2010/main" val="3721747028"/>
+      </p:ext>
+    </p:extLst>
+  </p:cSld>
+  <p:clrMapOvr>
+    <a:masterClrMapping/>
+  </p:clrMapOvr>
+</p:sld>
+</file>
+
+<file path=ppt/slides/slide2.xml><?xml version="1.0" encoding="utf-8"?>
+<p:sld xmlns:a="http://schemas.openxmlformats.org/drawingml/2006/main" xmlns:r="http://schemas.openxmlformats.org/officeDocument/2006/relationships" xmlns:p="http://schemas.openxmlformats.org/presentationml/2006/main">
+  <p:cSld>
+    <p:spTree>
+      <p:nvGrpSpPr>
+        <p:cNvPr id="1" name="">
+          <a:extLst>
+            <a:ext uri="{FF2B5EF4-FFF2-40B4-BE49-F238E27FC236}">
+              <a16:creationId xmlns:a16="http://schemas.microsoft.com/office/drawing/2014/main" id="{78A412FC-A9D0-D806-9D46-FDA8B6AE3956}"/>
+            </a:ext>
+          </a:extLst>
+        </p:cNvPr>
+        <p:cNvGrpSpPr/>
+        <p:nvPr/>
+      </p:nvGrpSpPr>
+      <p:grpSpPr>
+        <a:xfrm>
+          <a:off x="0" y="0"/>
+          <a:ext cx="0" cy="0"/>
+          <a:chOff x="0" y="0"/>
+          <a:chExt cx="0" cy="0"/>
+        </a:xfrm>
+      </p:grpSpPr>
+      <p:grpSp>
+        <p:nvGrpSpPr>
+          <p:cNvPr id="22" name="그룹 21">
+            <a:extLst>
+              <a:ext uri="{FF2B5EF4-FFF2-40B4-BE49-F238E27FC236}">
+                <a16:creationId xmlns:a16="http://schemas.microsoft.com/office/drawing/2014/main" id="{912B0CD5-6FD3-4138-DB5E-94D2A7C96250}"/>
+              </a:ext>
+            </a:extLst>
+          </p:cNvPr>
+          <p:cNvGrpSpPr/>
+          <p:nvPr/>
+        </p:nvGrpSpPr>
+        <p:grpSpPr>
+          <a:xfrm>
+            <a:off x="1821197" y="1637125"/>
+            <a:ext cx="6153563" cy="2365057"/>
+            <a:chOff x="561357" y="1535748"/>
+            <a:chExt cx="6153563" cy="2365057"/>
+          </a:xfrm>
+        </p:grpSpPr>
+        <p:sp>
+          <p:nvSpPr>
+            <p:cNvPr id="2" name="TextBox 1">
+              <a:extLst>
+                <a:ext uri="{FF2B5EF4-FFF2-40B4-BE49-F238E27FC236}">
+                  <a16:creationId xmlns:a16="http://schemas.microsoft.com/office/drawing/2014/main" id="{FACAC3F9-D41B-ABB3-A2A6-5EC9A0983767}"/>
+                </a:ext>
+              </a:extLst>
+            </p:cNvPr>
+            <p:cNvSpPr txBox="1"/>
+            <p:nvPr/>
+          </p:nvSpPr>
+          <p:spPr>
+            <a:xfrm>
+              <a:off x="687683" y="1550306"/>
+              <a:ext cx="1459315" cy="369332"/>
+            </a:xfrm>
+            <a:prstGeom prst="rect">
+              <a:avLst/>
+            </a:prstGeom>
+            <a:noFill/>
+          </p:spPr>
+          <p:txBody>
+            <a:bodyPr wrap="square" rtlCol="0">
+              <a:spAutoFit/>
+            </a:bodyPr>
+            <a:lstStyle/>
+            <a:p>
+              <a:r>
+                <a:rPr lang="en-US" altLang="ko-KR" dirty="0"/>
+                <a:t>position1</a:t>
+              </a:r>
+              <a:endParaRPr lang="ko-KR" altLang="en-US" dirty="0"/>
+            </a:p>
+          </p:txBody>
+        </p:sp>
+        <p:sp>
+          <p:nvSpPr>
+            <p:cNvPr id="4" name="TextBox 3">
+              <a:extLst>
+                <a:ext uri="{FF2B5EF4-FFF2-40B4-BE49-F238E27FC236}">
+                  <a16:creationId xmlns:a16="http://schemas.microsoft.com/office/drawing/2014/main" id="{158A88CB-6143-93CD-DF68-2E592A36864D}"/>
+                </a:ext>
+              </a:extLst>
+            </p:cNvPr>
+            <p:cNvSpPr txBox="1"/>
+            <p:nvPr/>
+          </p:nvSpPr>
+          <p:spPr>
+            <a:xfrm>
+              <a:off x="2886447" y="1550306"/>
+              <a:ext cx="1459315" cy="369332"/>
+            </a:xfrm>
+            <a:prstGeom prst="rect">
+              <a:avLst/>
+            </a:prstGeom>
+            <a:noFill/>
+          </p:spPr>
+          <p:txBody>
+            <a:bodyPr wrap="square" rtlCol="0">
+              <a:spAutoFit/>
+            </a:bodyPr>
+            <a:lstStyle/>
+            <a:p>
+              <a:r>
+                <a:rPr lang="en-US" altLang="ko-KR" dirty="0"/>
+                <a:t>position2</a:t>
+              </a:r>
+              <a:endParaRPr lang="ko-KR" altLang="en-US" dirty="0"/>
+            </a:p>
+          </p:txBody>
+        </p:sp>
+        <p:sp>
+          <p:nvSpPr>
+            <p:cNvPr id="8" name="TextBox 7">
+              <a:extLst>
+                <a:ext uri="{FF2B5EF4-FFF2-40B4-BE49-F238E27FC236}">
+                  <a16:creationId xmlns:a16="http://schemas.microsoft.com/office/drawing/2014/main" id="{8933A22F-6E80-BB9C-AA95-6CE9F64A8617}"/>
+                </a:ext>
+              </a:extLst>
+            </p:cNvPr>
+            <p:cNvSpPr txBox="1"/>
+            <p:nvPr/>
+          </p:nvSpPr>
+          <p:spPr>
+            <a:xfrm>
+              <a:off x="5255605" y="1535748"/>
+              <a:ext cx="1459315" cy="369332"/>
+            </a:xfrm>
+            <a:prstGeom prst="rect">
+              <a:avLst/>
+            </a:prstGeom>
+            <a:noFill/>
+          </p:spPr>
+          <p:txBody>
+            <a:bodyPr wrap="square" rtlCol="0">
+              <a:spAutoFit/>
+            </a:bodyPr>
+            <a:lstStyle/>
+            <a:p>
+              <a:r>
+                <a:rPr lang="en-US" altLang="ko-KR" dirty="0"/>
+                <a:t>position3</a:t>
+              </a:r>
+              <a:endParaRPr lang="ko-KR" altLang="en-US" dirty="0"/>
+            </a:p>
+          </p:txBody>
+        </p:sp>
+        <p:sp>
+          <p:nvSpPr>
+            <p:cNvPr id="13" name="TextBox 12">
+              <a:extLst>
+                <a:ext uri="{FF2B5EF4-FFF2-40B4-BE49-F238E27FC236}">
+                  <a16:creationId xmlns:a16="http://schemas.microsoft.com/office/drawing/2014/main" id="{B83C06D7-FBA8-DA2E-F9D3-073759FCCBF2}"/>
+                </a:ext>
+              </a:extLst>
+            </p:cNvPr>
+            <p:cNvSpPr txBox="1"/>
+            <p:nvPr/>
+          </p:nvSpPr>
+          <p:spPr>
+            <a:xfrm>
+              <a:off x="561357" y="3483253"/>
+              <a:ext cx="1459315" cy="369332"/>
+            </a:xfrm>
+            <a:prstGeom prst="rect">
+              <a:avLst/>
+            </a:prstGeom>
+            <a:noFill/>
+          </p:spPr>
+          <p:txBody>
+            <a:bodyPr wrap="square" rtlCol="0">
+              <a:spAutoFit/>
+            </a:bodyPr>
+            <a:lstStyle/>
+            <a:p>
+              <a:r>
+                <a:rPr lang="en-US" altLang="ko-KR" dirty="0"/>
+                <a:t>position1</a:t>
+              </a:r>
+              <a:endParaRPr lang="ko-KR" altLang="en-US" dirty="0"/>
+            </a:p>
+          </p:txBody>
+        </p:sp>
+        <p:sp>
+          <p:nvSpPr>
+            <p:cNvPr id="17" name="TextBox 16">
+              <a:extLst>
+                <a:ext uri="{FF2B5EF4-FFF2-40B4-BE49-F238E27FC236}">
+                  <a16:creationId xmlns:a16="http://schemas.microsoft.com/office/drawing/2014/main" id="{04C99FDD-DDE5-105B-F6ED-6B956393DB02}"/>
+                </a:ext>
+              </a:extLst>
+            </p:cNvPr>
+            <p:cNvSpPr txBox="1"/>
+            <p:nvPr/>
+          </p:nvSpPr>
+          <p:spPr>
+            <a:xfrm>
+              <a:off x="2712487" y="3518448"/>
+              <a:ext cx="1459315" cy="369332"/>
+            </a:xfrm>
+            <a:prstGeom prst="rect">
+              <a:avLst/>
+            </a:prstGeom>
+            <a:noFill/>
+          </p:spPr>
+          <p:txBody>
+            <a:bodyPr wrap="square" rtlCol="0">
+              <a:spAutoFit/>
+            </a:bodyPr>
+            <a:lstStyle/>
+            <a:p>
+              <a:r>
+                <a:rPr lang="en-US" altLang="ko-KR" dirty="0"/>
+                <a:t>position2</a:t>
+              </a:r>
+              <a:endParaRPr lang="ko-KR" altLang="en-US" dirty="0"/>
+            </a:p>
+          </p:txBody>
+        </p:sp>
+        <p:sp>
+          <p:nvSpPr>
+            <p:cNvPr id="20" name="TextBox 19">
+              <a:extLst>
+                <a:ext uri="{FF2B5EF4-FFF2-40B4-BE49-F238E27FC236}">
+                  <a16:creationId xmlns:a16="http://schemas.microsoft.com/office/drawing/2014/main" id="{21730E00-EC7D-DB56-ABDA-E037A1004608}"/>
+                </a:ext>
+              </a:extLst>
+            </p:cNvPr>
+            <p:cNvSpPr txBox="1"/>
+            <p:nvPr/>
+          </p:nvSpPr>
+          <p:spPr>
+            <a:xfrm>
+              <a:off x="5255604" y="3531473"/>
+              <a:ext cx="1459315" cy="369332"/>
+            </a:xfrm>
+            <a:prstGeom prst="rect">
+              <a:avLst/>
+            </a:prstGeom>
+            <a:noFill/>
+          </p:spPr>
+          <p:txBody>
+            <a:bodyPr wrap="square" rtlCol="0">
+              <a:spAutoFit/>
+            </a:bodyPr>
+            <a:lstStyle/>
+            <a:p>
+              <a:r>
+                <a:rPr lang="en-US" altLang="ko-KR" dirty="0"/>
+                <a:t>position3</a:t>
+              </a:r>
+              <a:endParaRPr lang="ko-KR" altLang="en-US" dirty="0"/>
+            </a:p>
+          </p:txBody>
+        </p:sp>
+      </p:grpSp>
+      <p:sp>
+        <p:nvSpPr>
+          <p:cNvPr id="25" name="TextBox 24">
+            <a:extLst>
+              <a:ext uri="{FF2B5EF4-FFF2-40B4-BE49-F238E27FC236}">
+                <a16:creationId xmlns:a16="http://schemas.microsoft.com/office/drawing/2014/main" id="{79C73539-0108-1981-26BE-6B0AE0C1B9D6}"/>
+              </a:ext>
+            </a:extLst>
+          </p:cNvPr>
+          <p:cNvSpPr txBox="1"/>
+          <p:nvPr/>
+        </p:nvSpPr>
+        <p:spPr>
+          <a:xfrm>
+            <a:off x="1848004" y="5736336"/>
+            <a:ext cx="1459315" cy="369332"/>
+          </a:xfrm>
+          <a:prstGeom prst="rect">
+            <a:avLst/>
+          </a:prstGeom>
+          <a:noFill/>
+        </p:spPr>
+        <p:txBody>
+          <a:bodyPr wrap="square" rtlCol="0">
+            <a:spAutoFit/>
+          </a:bodyPr>
+          <a:lstStyle/>
+          <a:p>
+            <a:r>
+              <a:rPr lang="en-US" altLang="ko-KR" dirty="0"/>
+              <a:t>position1</a:t>
+            </a:r>
+            <a:endParaRPr lang="ko-KR" altLang="en-US" dirty="0"/>
+          </a:p>
+        </p:txBody>
+      </p:sp>
+      <p:sp>
+        <p:nvSpPr>
+          <p:cNvPr id="27" name="TextBox 26">
+            <a:extLst>
+              <a:ext uri="{FF2B5EF4-FFF2-40B4-BE49-F238E27FC236}">
+                <a16:creationId xmlns:a16="http://schemas.microsoft.com/office/drawing/2014/main" id="{9C5D5AAB-D0A1-B40D-BEB7-BEC76E16AC68}"/>
+              </a:ext>
+            </a:extLst>
+          </p:cNvPr>
+          <p:cNvSpPr txBox="1"/>
+          <p:nvPr/>
+        </p:nvSpPr>
+        <p:spPr>
+          <a:xfrm>
+            <a:off x="4046768" y="5736336"/>
+            <a:ext cx="1459315" cy="369332"/>
+          </a:xfrm>
+          <a:prstGeom prst="rect">
+            <a:avLst/>
+          </a:prstGeom>
+          <a:noFill/>
+        </p:spPr>
+        <p:txBody>
+          <a:bodyPr wrap="square" rtlCol="0">
+            <a:spAutoFit/>
+          </a:bodyPr>
+          <a:lstStyle/>
+          <a:p>
+            <a:r>
+              <a:rPr lang="en-US" altLang="ko-KR" dirty="0"/>
+              <a:t>position2</a:t>
+            </a:r>
+            <a:endParaRPr lang="ko-KR" altLang="en-US" dirty="0"/>
+          </a:p>
+        </p:txBody>
+      </p:sp>
+      <p:sp>
+        <p:nvSpPr>
+          <p:cNvPr id="29" name="TextBox 28">
+            <a:extLst>
+              <a:ext uri="{FF2B5EF4-FFF2-40B4-BE49-F238E27FC236}">
+                <a16:creationId xmlns:a16="http://schemas.microsoft.com/office/drawing/2014/main" id="{922D9EED-ED33-6311-5FD3-3E49208E4112}"/>
+              </a:ext>
+            </a:extLst>
+          </p:cNvPr>
+          <p:cNvSpPr txBox="1"/>
+          <p:nvPr/>
+        </p:nvSpPr>
+        <p:spPr>
+          <a:xfrm>
+            <a:off x="6415926" y="5721778"/>
+            <a:ext cx="1459315" cy="369332"/>
+          </a:xfrm>
+          <a:prstGeom prst="rect">
+            <a:avLst/>
+          </a:prstGeom>
+          <a:noFill/>
+        </p:spPr>
+        <p:txBody>
+          <a:bodyPr wrap="square" rtlCol="0">
+            <a:spAutoFit/>
+          </a:bodyPr>
+          <a:lstStyle/>
+          <a:p>
+            <a:r>
+              <a:rPr lang="en-US" altLang="ko-KR" dirty="0"/>
+              <a:t>position3</a:t>
+            </a:r>
+            <a:endParaRPr lang="ko-KR" altLang="en-US" dirty="0"/>
+          </a:p>
+        </p:txBody>
+      </p:sp>
+      <p:pic>
+        <p:nvPicPr>
+          <p:cNvPr id="33" name="그림 32" descr="상징, 직사각형, 사각형, 디자인이(가) 표시된 사진&#10;&#10;AI 생성 콘텐츠는 정확하지 않을 수 있습니다.">
+            <a:extLst>
+              <a:ext uri="{FF2B5EF4-FFF2-40B4-BE49-F238E27FC236}">
+                <a16:creationId xmlns:a16="http://schemas.microsoft.com/office/drawing/2014/main" id="{5D444899-520F-F694-0852-7EDA0D81590D}"/>
+              </a:ext>
+            </a:extLst>
+          </p:cNvPr>
+          <p:cNvPicPr>
+            <a:picLocks noChangeAspect="1"/>
+          </p:cNvPicPr>
+          <p:nvPr/>
+        </p:nvPicPr>
+        <p:blipFill>
+          <a:blip r:embed="rId2">
+            <a:extLst>
+              <a:ext uri="{28A0092B-C50C-407E-A947-70E740481C1C}">
+                <a14:useLocalDpi xmlns:a14="http://schemas.microsoft.com/office/drawing/2010/main" val="0"/>
+              </a:ext>
+            </a:extLst>
+          </a:blip>
+          <a:stretch>
+            <a:fillRect/>
+          </a:stretch>
+        </p:blipFill>
+        <p:spPr>
+          <a:xfrm>
+            <a:off x="6749942" y="599300"/>
+            <a:ext cx="661975" cy="656542"/>
+          </a:xfrm>
+          <a:prstGeom prst="rect">
+            <a:avLst/>
+          </a:prstGeom>
+        </p:spPr>
+      </p:pic>
+      <p:pic>
+        <p:nvPicPr>
+          <p:cNvPr id="35" name="그림 34" descr="직사각형, 상징, 사각형, 디자인이(가) 표시된 사진&#10;&#10;AI 생성 콘텐츠는 정확하지 않을 수 있습니다.">
+            <a:extLst>
+              <a:ext uri="{FF2B5EF4-FFF2-40B4-BE49-F238E27FC236}">
+                <a16:creationId xmlns:a16="http://schemas.microsoft.com/office/drawing/2014/main" id="{634406D3-D8E2-45A3-BD8C-2C5FFA796910}"/>
+              </a:ext>
+            </a:extLst>
+          </p:cNvPr>
+          <p:cNvPicPr>
+            <a:picLocks noChangeAspect="1"/>
+          </p:cNvPicPr>
+          <p:nvPr/>
+        </p:nvPicPr>
+        <p:blipFill>
+          <a:blip r:embed="rId3">
+            <a:extLst>
+              <a:ext uri="{28A0092B-C50C-407E-A947-70E740481C1C}">
+                <a14:useLocalDpi xmlns:a14="http://schemas.microsoft.com/office/drawing/2010/main" val="0"/>
+              </a:ext>
+            </a:extLst>
+          </a:blip>
+          <a:stretch>
+            <a:fillRect/>
+          </a:stretch>
+        </p:blipFill>
+        <p:spPr>
+          <a:xfrm>
+            <a:off x="2198182" y="599300"/>
+            <a:ext cx="657435" cy="656542"/>
+          </a:xfrm>
+          <a:prstGeom prst="rect">
+            <a:avLst/>
+          </a:prstGeom>
+        </p:spPr>
+      </p:pic>
+      <p:pic>
+        <p:nvPicPr>
+          <p:cNvPr id="37" name="그림 36" descr="상징, 직사각형, 사각형, 디자인이(가) 표시된 사진&#10;&#10;AI 생성 콘텐츠는 정확하지 않을 수 있습니다.">
+            <a:extLst>
+              <a:ext uri="{FF2B5EF4-FFF2-40B4-BE49-F238E27FC236}">
+                <a16:creationId xmlns:a16="http://schemas.microsoft.com/office/drawing/2014/main" id="{2F272A34-72D0-3CAF-73DF-EB2D4F8C2EB1}"/>
+              </a:ext>
+            </a:extLst>
+          </p:cNvPr>
+          <p:cNvPicPr>
+            <a:picLocks noChangeAspect="1"/>
+          </p:cNvPicPr>
+          <p:nvPr/>
+        </p:nvPicPr>
+        <p:blipFill>
+          <a:blip r:embed="rId4">
+            <a:extLst>
+              <a:ext uri="{28A0092B-C50C-407E-A947-70E740481C1C}">
+                <a14:useLocalDpi xmlns:a14="http://schemas.microsoft.com/office/drawing/2010/main" val="0"/>
+              </a:ext>
+            </a:extLst>
+          </a:blip>
+          <a:stretch>
+            <a:fillRect/>
+          </a:stretch>
+        </p:blipFill>
+        <p:spPr>
+          <a:xfrm>
+            <a:off x="4367808" y="599300"/>
+            <a:ext cx="660149" cy="656542"/>
+          </a:xfrm>
+          <a:prstGeom prst="rect">
+            <a:avLst/>
+          </a:prstGeom>
+        </p:spPr>
+      </p:pic>
+      <p:pic>
+        <p:nvPicPr>
+          <p:cNvPr id="3" name="그림 2" descr="상징, 직사각형, 사각형, 디자인이(가) 표시된 사진&#10;&#10;AI 생성 콘텐츠는 정확하지 않을 수 있습니다.">
+            <a:extLst>
+              <a:ext uri="{FF2B5EF4-FFF2-40B4-BE49-F238E27FC236}">
+                <a16:creationId xmlns:a16="http://schemas.microsoft.com/office/drawing/2014/main" id="{2DDBB2B4-C156-4F97-741B-221F0C4BC0AD}"/>
+              </a:ext>
+            </a:extLst>
+          </p:cNvPr>
+          <p:cNvPicPr>
+            <a:picLocks noChangeAspect="1"/>
+          </p:cNvPicPr>
+          <p:nvPr/>
+        </p:nvPicPr>
+        <p:blipFill>
+          <a:blip r:embed="rId2">
+            <a:extLst>
+              <a:ext uri="{28A0092B-C50C-407E-A947-70E740481C1C}">
+                <a14:useLocalDpi xmlns:a14="http://schemas.microsoft.com/office/drawing/2010/main" val="0"/>
+              </a:ext>
+            </a:extLst>
+          </a:blip>
+          <a:stretch>
+            <a:fillRect/>
+          </a:stretch>
+        </p:blipFill>
+        <p:spPr>
+          <a:xfrm>
+            <a:off x="6685290" y="2502451"/>
+            <a:ext cx="791280" cy="784786"/>
+          </a:xfrm>
+          <a:prstGeom prst="rect">
+            <a:avLst/>
+          </a:prstGeom>
+        </p:spPr>
+      </p:pic>
+      <p:pic>
+        <p:nvPicPr>
+          <p:cNvPr id="5" name="그림 4" descr="직사각형, 상징, 사각형, 디자인이(가) 표시된 사진&#10;&#10;AI 생성 콘텐츠는 정확하지 않을 수 있습니다.">
+            <a:extLst>
+              <a:ext uri="{FF2B5EF4-FFF2-40B4-BE49-F238E27FC236}">
+                <a16:creationId xmlns:a16="http://schemas.microsoft.com/office/drawing/2014/main" id="{241BB0E6-3A18-93A4-A632-4A1C762DC449}"/>
+              </a:ext>
+            </a:extLst>
+          </p:cNvPr>
+          <p:cNvPicPr>
+            <a:picLocks noChangeAspect="1"/>
+          </p:cNvPicPr>
+          <p:nvPr/>
+        </p:nvPicPr>
+        <p:blipFill>
+          <a:blip r:embed="rId3">
+            <a:extLst>
+              <a:ext uri="{28A0092B-C50C-407E-A947-70E740481C1C}">
+                <a14:useLocalDpi xmlns:a14="http://schemas.microsoft.com/office/drawing/2010/main" val="0"/>
+              </a:ext>
+            </a:extLst>
+          </a:blip>
+          <a:stretch>
+            <a:fillRect/>
+          </a:stretch>
+        </p:blipFill>
+        <p:spPr>
+          <a:xfrm>
+            <a:off x="1947523" y="2502451"/>
+            <a:ext cx="785853" cy="784786"/>
+          </a:xfrm>
+          <a:prstGeom prst="rect">
+            <a:avLst/>
+          </a:prstGeom>
+        </p:spPr>
+      </p:pic>
+      <p:pic>
+        <p:nvPicPr>
+          <p:cNvPr id="11" name="그림 10" descr="상징, 직사각형, 사각형, 디자인이(가) 표시된 사진&#10;&#10;AI 생성 콘텐츠는 정확하지 않을 수 있습니다.">
+            <a:extLst>
+              <a:ext uri="{FF2B5EF4-FFF2-40B4-BE49-F238E27FC236}">
+                <a16:creationId xmlns:a16="http://schemas.microsoft.com/office/drawing/2014/main" id="{2DB0A0CF-5C7E-AFCA-DC94-BA4067F1BA48}"/>
+              </a:ext>
+            </a:extLst>
+          </p:cNvPr>
+          <p:cNvPicPr>
+            <a:picLocks noChangeAspect="1"/>
+          </p:cNvPicPr>
+          <p:nvPr/>
+        </p:nvPicPr>
+        <p:blipFill>
+          <a:blip r:embed="rId4">
+            <a:extLst>
+              <a:ext uri="{28A0092B-C50C-407E-A947-70E740481C1C}">
+                <a14:useLocalDpi xmlns:a14="http://schemas.microsoft.com/office/drawing/2010/main" val="0"/>
+              </a:ext>
+            </a:extLst>
+          </a:blip>
+          <a:stretch>
+            <a:fillRect/>
+          </a:stretch>
+        </p:blipFill>
+        <p:spPr>
+          <a:xfrm>
+            <a:off x="4195691" y="2502451"/>
+            <a:ext cx="789098" cy="784786"/>
+          </a:xfrm>
+          <a:prstGeom prst="rect">
+            <a:avLst/>
+          </a:prstGeom>
+        </p:spPr>
+      </p:pic>
+      <p:pic>
+        <p:nvPicPr>
+          <p:cNvPr id="14" name="그림 13" descr="상징, 직사각형, 사각형, 디자인이(가) 표시된 사진&#10;&#10;AI 생성 콘텐츠는 정확하지 않을 수 있습니다.">
+            <a:extLst>
+              <a:ext uri="{FF2B5EF4-FFF2-40B4-BE49-F238E27FC236}">
+                <a16:creationId xmlns:a16="http://schemas.microsoft.com/office/drawing/2014/main" id="{3CAE1DD8-177A-2B09-3D80-CB0AE40AD48D}"/>
+              </a:ext>
+            </a:extLst>
+          </p:cNvPr>
+          <p:cNvPicPr>
+            <a:picLocks noChangeAspect="1"/>
+          </p:cNvPicPr>
+          <p:nvPr/>
+        </p:nvPicPr>
+        <p:blipFill>
+          <a:blip r:embed="rId2">
+            <a:extLst>
+              <a:ext uri="{28A0092B-C50C-407E-A947-70E740481C1C}">
+                <a14:useLocalDpi xmlns:a14="http://schemas.microsoft.com/office/drawing/2010/main" val="0"/>
+              </a:ext>
+            </a:extLst>
+          </a:blip>
+          <a:stretch>
+            <a:fillRect/>
+          </a:stretch>
+        </p:blipFill>
+        <p:spPr>
+          <a:xfrm>
+            <a:off x="6736053" y="4851064"/>
+            <a:ext cx="546803" cy="542315"/>
+          </a:xfrm>
+          <a:prstGeom prst="rect">
+            <a:avLst/>
+          </a:prstGeom>
+        </p:spPr>
+      </p:pic>
+      <p:pic>
+        <p:nvPicPr>
+          <p:cNvPr id="18" name="그림 17" descr="직사각형, 상징, 사각형, 디자인이(가) 표시된 사진&#10;&#10;AI 생성 콘텐츠는 정확하지 않을 수 있습니다.">
+            <a:extLst>
+              <a:ext uri="{FF2B5EF4-FFF2-40B4-BE49-F238E27FC236}">
+                <a16:creationId xmlns:a16="http://schemas.microsoft.com/office/drawing/2014/main" id="{81B75BA8-D248-7ED6-D3C7-138C98126FA0}"/>
+              </a:ext>
+            </a:extLst>
+          </p:cNvPr>
+          <p:cNvPicPr>
+            <a:picLocks noChangeAspect="1"/>
+          </p:cNvPicPr>
+          <p:nvPr/>
+        </p:nvPicPr>
+        <p:blipFill>
+          <a:blip r:embed="rId3">
+            <a:extLst>
+              <a:ext uri="{28A0092B-C50C-407E-A947-70E740481C1C}">
+                <a14:useLocalDpi xmlns:a14="http://schemas.microsoft.com/office/drawing/2010/main" val="0"/>
+              </a:ext>
+            </a:extLst>
+          </a:blip>
+          <a:stretch>
+            <a:fillRect/>
+          </a:stretch>
+        </p:blipFill>
+        <p:spPr>
+          <a:xfrm>
+            <a:off x="2119640" y="4851544"/>
+            <a:ext cx="543053" cy="542316"/>
+          </a:xfrm>
+          <a:prstGeom prst="rect">
+            <a:avLst/>
+          </a:prstGeom>
+        </p:spPr>
+      </p:pic>
+      <p:pic>
+        <p:nvPicPr>
+          <p:cNvPr id="21" name="그림 20" descr="상징, 직사각형, 사각형, 디자인이(가) 표시된 사진&#10;&#10;AI 생성 콘텐츠는 정확하지 않을 수 있습니다.">
+            <a:extLst>
+              <a:ext uri="{FF2B5EF4-FFF2-40B4-BE49-F238E27FC236}">
+                <a16:creationId xmlns:a16="http://schemas.microsoft.com/office/drawing/2014/main" id="{E4C7B27D-280B-3598-6FCD-1ABED8AA698F}"/>
+              </a:ext>
+            </a:extLst>
+          </p:cNvPr>
+          <p:cNvPicPr>
+            <a:picLocks noChangeAspect="1"/>
+          </p:cNvPicPr>
+          <p:nvPr/>
+        </p:nvPicPr>
+        <p:blipFill>
+          <a:blip r:embed="rId4">
+            <a:extLst>
+              <a:ext uri="{28A0092B-C50C-407E-A947-70E740481C1C}">
+                <a14:useLocalDpi xmlns:a14="http://schemas.microsoft.com/office/drawing/2010/main" val="0"/>
+              </a:ext>
+            </a:extLst>
+          </a:blip>
+          <a:stretch>
+            <a:fillRect/>
+          </a:stretch>
+        </p:blipFill>
+        <p:spPr>
+          <a:xfrm>
+            <a:off x="4367808" y="4851544"/>
+            <a:ext cx="545295" cy="542315"/>
+          </a:xfrm>
+          <a:prstGeom prst="rect">
+            <a:avLst/>
+          </a:prstGeom>
+        </p:spPr>
+      </p:pic>
+    </p:spTree>
+    <p:extLst>
+      <p:ext uri="{BB962C8B-B14F-4D97-AF65-F5344CB8AC3E}">
+        <p14:creationId xmlns:p14="http://schemas.microsoft.com/office/powerpoint/2010/main" val="778853921"/>
+      </p:ext>
+    </p:extLst>
+  </p:cSld>
+  <p:clrMapOvr>
+    <a:masterClrMapping/>
+  </p:clrMapOvr>
+</p:sld>
+</file>
+
+<file path=ppt/slides/slide3.xml><?xml version="1.0" encoding="utf-8"?>
+<p:sld xmlns:a="http://schemas.openxmlformats.org/drawingml/2006/main" xmlns:r="http://schemas.openxmlformats.org/officeDocument/2006/relationships" xmlns:p="http://schemas.openxmlformats.org/presentationml/2006/main">
+  <p:cSld>
+    <p:spTree>
+      <p:nvGrpSpPr>
+        <p:cNvPr id="1" name=""/>
+        <p:cNvGrpSpPr/>
+        <p:nvPr/>
+      </p:nvGrpSpPr>
+      <p:grpSpPr>
+        <a:xfrm>
+          <a:off x="0" y="0"/>
+          <a:ext cx="0" cy="0"/>
+          <a:chOff x="0" y="0"/>
+          <a:chExt cx="0" cy="0"/>
+        </a:xfrm>
+      </p:grpSpPr>
+      <p:grpSp>
+        <p:nvGrpSpPr>
+          <p:cNvPr id="7" name="그룹 6">
+            <a:extLst>
+              <a:ext uri="{FF2B5EF4-FFF2-40B4-BE49-F238E27FC236}">
+                <a16:creationId xmlns:a16="http://schemas.microsoft.com/office/drawing/2014/main" id="{DC56176A-B380-BA92-A0AB-3EC08B3BD051}"/>
+              </a:ext>
+            </a:extLst>
+          </p:cNvPr>
+          <p:cNvGrpSpPr/>
+          <p:nvPr/>
+        </p:nvGrpSpPr>
+        <p:grpSpPr>
+          <a:xfrm>
+            <a:off x="1930400" y="579120"/>
+            <a:ext cx="8585200" cy="6278880"/>
+            <a:chOff x="1930400" y="579120"/>
+            <a:chExt cx="8585200" cy="6278880"/>
+          </a:xfrm>
+        </p:grpSpPr>
+        <p:sp>
+          <p:nvSpPr>
+            <p:cNvPr id="6" name="직사각형 5">
+              <a:extLst>
+                <a:ext uri="{FF2B5EF4-FFF2-40B4-BE49-F238E27FC236}">
+                  <a16:creationId xmlns:a16="http://schemas.microsoft.com/office/drawing/2014/main" id="{4339EB0D-4C0E-DFDF-654E-A9B825C76A67}"/>
+                </a:ext>
+              </a:extLst>
+            </p:cNvPr>
+            <p:cNvSpPr/>
+            <p:nvPr/>
+          </p:nvSpPr>
+          <p:spPr>
+            <a:xfrm>
+              <a:off x="1930400" y="579120"/>
+              <a:ext cx="8585200" cy="6278880"/>
+            </a:xfrm>
+            <a:prstGeom prst="rect">
+              <a:avLst/>
+            </a:prstGeom>
+            <a:solidFill>
+              <a:schemeClr val="bg1"/>
+            </a:solidFill>
+          </p:spPr>
+          <p:style>
+            <a:lnRef idx="2">
+              <a:schemeClr val="accent1">
+                <a:shade val="15000"/>
+              </a:schemeClr>
+            </a:lnRef>
+            <a:fillRef idx="1">
+              <a:schemeClr val="accent1"/>
+            </a:fillRef>
+            <a:effectRef idx="0">
+              <a:schemeClr val="accent1"/>
+            </a:effectRef>
+            <a:fontRef idx="minor">
+              <a:schemeClr val="lt1"/>
+            </a:fontRef>
+          </p:style>
+          <p:txBody>
+            <a:bodyPr rtlCol="0" anchor="ctr"/>
+            <a:lstStyle/>
+            <a:p>
+              <a:pPr algn="ctr"/>
+              <a:endParaRPr lang="ko-KR" altLang="en-US"/>
+            </a:p>
+          </p:txBody>
+        </p:sp>
+        <p:pic>
+          <p:nvPicPr>
+            <p:cNvPr id="5" name="그림 4" descr="직사각형, 상징, 사각형, 디자인이(가) 표시된 사진&#10;&#10;AI 생성 콘텐츠는 정확하지 않을 수 있습니다.">
+              <a:extLst>
+                <a:ext uri="{FF2B5EF4-FFF2-40B4-BE49-F238E27FC236}">
+                  <a16:creationId xmlns:a16="http://schemas.microsoft.com/office/drawing/2014/main" id="{7CCA356C-4109-5F66-46D9-837CC90F6965}"/>
+                </a:ext>
+              </a:extLst>
+            </p:cNvPr>
+            <p:cNvPicPr>
+              <a:picLocks noChangeAspect="1"/>
+            </p:cNvPicPr>
+            <p:nvPr/>
+          </p:nvPicPr>
+          <p:blipFill>
+            <a:blip r:embed="rId2">
+              <a:extLst>
+                <a:ext uri="{28A0092B-C50C-407E-A947-70E740481C1C}">
+                  <a14:useLocalDpi xmlns:a14="http://schemas.microsoft.com/office/drawing/2010/main" val="0"/>
+                </a:ext>
+              </a:extLst>
+            </a:blip>
+            <a:stretch>
+              <a:fillRect/>
+            </a:stretch>
+          </p:blipFill>
+          <p:spPr>
+            <a:xfrm>
+              <a:off x="5440558" y="2647621"/>
+              <a:ext cx="1564883" cy="1562757"/>
+            </a:xfrm>
+            <a:prstGeom prst="rect">
+              <a:avLst/>
+            </a:prstGeom>
+          </p:spPr>
+        </p:pic>
+      </p:grpSp>
+    </p:spTree>
+    <p:extLst>
+      <p:ext uri="{BB962C8B-B14F-4D97-AF65-F5344CB8AC3E}">
+        <p14:creationId xmlns:p14="http://schemas.microsoft.com/office/powerpoint/2010/main" val="558941033"/>
       </p:ext>
     </p:extLst>
   </p:cSld>

</xml_diff>